<commit_message>
Updated the link to Bootcamp git URL
</commit_message>
<xml_diff>
--- a/Lab/DataProcessing/Python Data Processing Lab.pptx
+++ b/Lab/DataProcessing/Python Data Processing Lab.pptx
@@ -247,7 +247,7 @@
           <a:p>
             <a:fld id="{C6101D7A-20B5-4951-9D95-B91E12027494}" type="datetimeFigureOut">
               <a:rPr lang="en-US" smtClean="0"/>
-              <a:t>9/13/2018</a:t>
+              <a:t>9/14/2018</a:t>
             </a:fld>
             <a:endParaRPr lang="en-US"/>
           </a:p>
@@ -417,7 +417,7 @@
           <a:p>
             <a:fld id="{C6101D7A-20B5-4951-9D95-B91E12027494}" type="datetimeFigureOut">
               <a:rPr lang="en-US" smtClean="0"/>
-              <a:t>9/13/2018</a:t>
+              <a:t>9/14/2018</a:t>
             </a:fld>
             <a:endParaRPr lang="en-US"/>
           </a:p>
@@ -597,7 +597,7 @@
           <a:p>
             <a:fld id="{C6101D7A-20B5-4951-9D95-B91E12027494}" type="datetimeFigureOut">
               <a:rPr lang="en-US" smtClean="0"/>
-              <a:t>9/13/2018</a:t>
+              <a:t>9/14/2018</a:t>
             </a:fld>
             <a:endParaRPr lang="en-US"/>
           </a:p>
@@ -767,7 +767,7 @@
           <a:p>
             <a:fld id="{C6101D7A-20B5-4951-9D95-B91E12027494}" type="datetimeFigureOut">
               <a:rPr lang="en-US" smtClean="0"/>
-              <a:t>9/13/2018</a:t>
+              <a:t>9/14/2018</a:t>
             </a:fld>
             <a:endParaRPr lang="en-US"/>
           </a:p>
@@ -1013,7 +1013,7 @@
           <a:p>
             <a:fld id="{C6101D7A-20B5-4951-9D95-B91E12027494}" type="datetimeFigureOut">
               <a:rPr lang="en-US" smtClean="0"/>
-              <a:t>9/13/2018</a:t>
+              <a:t>9/14/2018</a:t>
             </a:fld>
             <a:endParaRPr lang="en-US"/>
           </a:p>
@@ -1245,7 +1245,7 @@
           <a:p>
             <a:fld id="{C6101D7A-20B5-4951-9D95-B91E12027494}" type="datetimeFigureOut">
               <a:rPr lang="en-US" smtClean="0"/>
-              <a:t>9/13/2018</a:t>
+              <a:t>9/14/2018</a:t>
             </a:fld>
             <a:endParaRPr lang="en-US"/>
           </a:p>
@@ -1612,7 +1612,7 @@
           <a:p>
             <a:fld id="{C6101D7A-20B5-4951-9D95-B91E12027494}" type="datetimeFigureOut">
               <a:rPr lang="en-US" smtClean="0"/>
-              <a:t>9/13/2018</a:t>
+              <a:t>9/14/2018</a:t>
             </a:fld>
             <a:endParaRPr lang="en-US"/>
           </a:p>
@@ -1730,7 +1730,7 @@
           <a:p>
             <a:fld id="{C6101D7A-20B5-4951-9D95-B91E12027494}" type="datetimeFigureOut">
               <a:rPr lang="en-US" smtClean="0"/>
-              <a:t>9/13/2018</a:t>
+              <a:t>9/14/2018</a:t>
             </a:fld>
             <a:endParaRPr lang="en-US"/>
           </a:p>
@@ -1825,7 +1825,7 @@
           <a:p>
             <a:fld id="{C6101D7A-20B5-4951-9D95-B91E12027494}" type="datetimeFigureOut">
               <a:rPr lang="en-US" smtClean="0"/>
-              <a:t>9/13/2018</a:t>
+              <a:t>9/14/2018</a:t>
             </a:fld>
             <a:endParaRPr lang="en-US"/>
           </a:p>
@@ -2102,7 +2102,7 @@
           <a:p>
             <a:fld id="{C6101D7A-20B5-4951-9D95-B91E12027494}" type="datetimeFigureOut">
               <a:rPr lang="en-US" smtClean="0"/>
-              <a:t>9/13/2018</a:t>
+              <a:t>9/14/2018</a:t>
             </a:fld>
             <a:endParaRPr lang="en-US"/>
           </a:p>
@@ -2355,7 +2355,7 @@
           <a:p>
             <a:fld id="{C6101D7A-20B5-4951-9D95-B91E12027494}" type="datetimeFigureOut">
               <a:rPr lang="en-US" smtClean="0"/>
-              <a:t>9/13/2018</a:t>
+              <a:t>9/14/2018</a:t>
             </a:fld>
             <a:endParaRPr lang="en-US"/>
           </a:p>
@@ -2568,7 +2568,7 @@
           <a:p>
             <a:fld id="{C6101D7A-20B5-4951-9D95-B91E12027494}" type="datetimeFigureOut">
               <a:rPr lang="en-US" smtClean="0"/>
-              <a:t>9/13/2018</a:t>
+              <a:t>9/14/2018</a:t>
             </a:fld>
             <a:endParaRPr lang="en-US"/>
           </a:p>
@@ -3043,7 +3043,13 @@
               <a:rPr lang="en-US" sz="2400" dirty="0" smtClean="0">
                 <a:hlinkClick r:id="rId2"/>
               </a:rPr>
-              <a:t>github.com/EmoryPython/Lab</a:t>
+              <a:t>github.com/EmoryPython/</a:t>
+            </a:r>
+            <a:r>
+              <a:rPr lang="en-US" sz="2400" dirty="0" smtClean="0">
+                <a:hlinkClick r:id="rId2"/>
+              </a:rPr>
+              <a:t>Bootcamp</a:t>
             </a:r>
             <a:endParaRPr lang="en-US" sz="2400" dirty="0" smtClean="0"/>
           </a:p>
@@ -3141,21 +3147,22 @@
       </p:sp>
       <p:pic>
         <p:nvPicPr>
-          <p:cNvPr id="6" name="Picture 5"/>
+          <p:cNvPr id="4" name="Picture 3"/>
           <p:cNvPicPr>
             <a:picLocks noChangeAspect="1"/>
           </p:cNvPicPr>
           <p:nvPr/>
         </p:nvPicPr>
-        <p:blipFill rotWithShape="1">
+        <p:blipFill>
           <a:blip r:embed="rId4"/>
-          <a:srcRect l="56096"/>
-          <a:stretch/>
+          <a:stretch>
+            <a:fillRect/>
+          </a:stretch>
         </p:blipFill>
         <p:spPr>
           <a:xfrm>
-            <a:off x="7221639" y="2031357"/>
-            <a:ext cx="4756230" cy="2979692"/>
+            <a:off x="7486021" y="2239766"/>
+            <a:ext cx="4565832" cy="2707079"/>
           </a:xfrm>
           <a:prstGeom prst="rect">
             <a:avLst/>

</xml_diff>